<commit_message>
Updated slides with full title, names, and 1 edit
The single edit was the omission of a line from the "Key Insights" slide that was not used
</commit_message>
<xml_diff>
--- a/DataAcids_0076.pptx
+++ b/DataAcids_0076.pptx
@@ -163,7 +163,8 @@
   <p1510:revLst>
     <p1510:client id="{36F02DEA-61AE-793B-F3AD-123DE182B0AB}" v="331" dt="2025-04-27T23:32:28.273"/>
     <p1510:client id="{3F253631-18EE-7F89-68C0-169FB989A223}" v="512" dt="2025-04-28T00:08:15.976"/>
-    <p1510:client id="{F9B55F38-EE35-430D-8F46-9F2663D042CB}" v="195" dt="2025-04-28T00:10:50.262"/>
+    <p1510:client id="{F9B55F38-EE35-430D-8F46-9F2663D042CB}" v="241" dt="2025-04-28T15:29:46.924"/>
+    <p1510:client id="{FC2ACE8D-FD97-8E3E-CE04-A030B8D76380}" v="87" dt="2025-04-28T16:45:05.571"/>
   </p1510:revLst>
 </p1510:revInfo>
 </file>
@@ -262,7 +263,7 @@
           <a:p>
             <a:fld id="{258BFD57-AB0A-470B-A7AF-56DFE7B5174A}" type="datetimeFigureOut">
               <a:rPr lang="en-US" smtClean="0"/>
-              <a:t>4/27/2025</a:t>
+              <a:t>4/28/2025</a:t>
             </a:fld>
             <a:endParaRPr lang="en-US"/>
           </a:p>
@@ -439,7 +440,7 @@
           <a:p>
             <a:fld id="{D4B3339F-6CEA-4641-BE08-40DAFD6FCF25}" type="datetimeFigureOut">
               <a:rPr lang="en-US" smtClean="0"/>
-              <a:t>4/27/2025</a:t>
+              <a:t>4/28/2025</a:t>
             </a:fld>
             <a:endParaRPr lang="en-US"/>
           </a:p>
@@ -771,7 +772,7 @@
           <a:p>
             <a:fld id="{DEF75CB5-5666-5049-9AE0-38EFD385C21E}" type="slidenum">
               <a:rPr lang="en-US" smtClean="0"/>
-              <a:t>1</a:t>
+              <a:t>2</a:t>
             </a:fld>
             <a:endParaRPr lang="en-US"/>
           </a:p>
@@ -855,7 +856,7 @@
           <a:p>
             <a:fld id="{DEF75CB5-5666-5049-9AE0-38EFD385C21E}" type="slidenum">
               <a:rPr lang="en-US" smtClean="0"/>
-              <a:t>20</a:t>
+              <a:t>21</a:t>
             </a:fld>
             <a:endParaRPr lang="en-US"/>
           </a:p>
@@ -986,7 +987,7 @@
                 <a:tabLst/>
                 <a:defRPr/>
               </a:pPr>
-              <a:t>2</a:t>
+              <a:t>3</a:t>
             </a:fld>
             <a:endParaRPr kumimoji="0" lang="en-US" sz="1200" b="0" i="0" u="none" strike="noStrike" kern="1200" cap="none" spc="0" normalizeH="0" baseline="0" noProof="0">
               <a:ln>
@@ -1083,7 +1084,7 @@
           <a:p>
             <a:fld id="{DEF75CB5-5666-5049-9AE0-38EFD385C21E}" type="slidenum">
               <a:rPr lang="en-US" smtClean="0"/>
-              <a:t>3</a:t>
+              <a:t>4</a:t>
             </a:fld>
             <a:endParaRPr lang="en-US"/>
           </a:p>
@@ -1167,7 +1168,7 @@
           <a:p>
             <a:fld id="{DEF75CB5-5666-5049-9AE0-38EFD385C21E}" type="slidenum">
               <a:rPr lang="en-US" smtClean="0"/>
-              <a:t>4</a:t>
+              <a:t>5</a:t>
             </a:fld>
             <a:endParaRPr lang="en-US"/>
           </a:p>
@@ -1251,7 +1252,7 @@
           <a:p>
             <a:fld id="{DEF75CB5-5666-5049-9AE0-38EFD385C21E}" type="slidenum">
               <a:rPr lang="en-US" smtClean="0"/>
-              <a:t>5</a:t>
+              <a:t>6</a:t>
             </a:fld>
             <a:endParaRPr lang="en-US"/>
           </a:p>
@@ -1335,7 +1336,7 @@
           <a:p>
             <a:fld id="{DEF75CB5-5666-5049-9AE0-38EFD385C21E}" type="slidenum">
               <a:rPr lang="en-US" smtClean="0"/>
-              <a:t>6</a:t>
+              <a:t>7</a:t>
             </a:fld>
             <a:endParaRPr lang="en-US"/>
           </a:p>
@@ -1419,7 +1420,7 @@
           <a:p>
             <a:fld id="{DEF75CB5-5666-5049-9AE0-38EFD385C21E}" type="slidenum">
               <a:rPr lang="en-US" smtClean="0"/>
-              <a:t>8</a:t>
+              <a:t>9</a:t>
             </a:fld>
             <a:endParaRPr lang="en-US"/>
           </a:p>
@@ -1587,7 +1588,7 @@
           <a:p>
             <a:fld id="{DEF75CB5-5666-5049-9AE0-38EFD385C21E}" type="slidenum">
               <a:rPr lang="en-US" smtClean="0"/>
-              <a:t>19</a:t>
+              <a:t>20</a:t>
             </a:fld>
             <a:endParaRPr lang="en-US"/>
           </a:p>
@@ -10376,7 +10377,7 @@
           <a:lstStyle/>
           <a:p>
             <a:r>
-              <a:rPr lang="en-US" dirty="0">
+              <a:rPr lang="en-US">
                 <a:cs typeface="Biome"/>
               </a:rPr>
               <a:t>Conservation Status Across report Groups Continued</a:t>
@@ -13312,7 +13313,7 @@
           <a:lstStyle/>
           <a:p>
             <a:r>
-              <a:rPr lang="en-US" dirty="0">
+              <a:rPr lang="en-US">
                 <a:cs typeface="Biome"/>
               </a:rPr>
               <a:t>Extinction risk has grown over time Continued</a:t>
@@ -13604,13 +13605,13 @@
           <a:lstStyle/>
           <a:p>
             <a:r>
-              <a:rPr lang="en-US" dirty="0" err="1">
+              <a:rPr lang="en-US" err="1">
                 <a:cs typeface="Biome"/>
               </a:rPr>
               <a:t>DATa</a:t>
             </a:r>
             <a:r>
-              <a:rPr lang="en-US" dirty="0">
+              <a:rPr lang="en-US">
                 <a:cs typeface="Biome"/>
               </a:rPr>
               <a:t> quality challenges Continued</a:t>
@@ -13998,7 +13999,7 @@
           <a:lstStyle/>
           <a:p>
             <a:r>
-              <a:rPr lang="en-US" dirty="0">
+              <a:rPr lang="en-US">
                 <a:cs typeface="Biome"/>
               </a:rPr>
               <a:t>What Drives Extinction Risk? Continued</a:t>
@@ -14188,24 +14189,24 @@
           <a:lstStyle/>
           <a:p>
             <a:r>
-              <a:rPr lang="en-US" dirty="0">
+              <a:rPr lang="en-US">
                 <a:cs typeface="Biome"/>
               </a:rPr>
               <a:t>Deep Learning using </a:t>
             </a:r>
             <a:r>
-              <a:rPr lang="en-US" dirty="0" err="1">
+              <a:rPr lang="en-US" err="1">
                 <a:cs typeface="Biome"/>
               </a:rPr>
               <a:t>tensorflow</a:t>
             </a:r>
             <a:r>
-              <a:rPr lang="en-US" dirty="0">
+              <a:rPr lang="en-US">
                 <a:cs typeface="Biome"/>
               </a:rPr>
               <a:t> neural networks</a:t>
             </a:r>
-            <a:endParaRPr lang="en-US" dirty="0"/>
+            <a:endParaRPr lang="en-US"/>
           </a:p>
         </p:txBody>
       </p:sp>
@@ -14233,7 +14234,7 @@
           <a:lstStyle/>
           <a:p>
             <a:r>
-              <a:rPr lang="en-US" dirty="0">
+              <a:rPr lang="en-US">
                 <a:latin typeface="Calibri"/>
                 <a:ea typeface="Calibri"/>
                 <a:cs typeface="Calibri"/>
@@ -14241,7 +14242,7 @@
               <a:t>By leveraging a parameter grid to accomplish hyperparameter tuning, we arrived at the model configuration with an accuracy of 0.79 (4 layers, applying '</a:t>
             </a:r>
             <a:r>
-              <a:rPr lang="en-US" dirty="0" err="1">
+              <a:rPr lang="en-US" err="1">
                 <a:latin typeface="Calibri"/>
                 <a:ea typeface="Calibri"/>
                 <a:cs typeface="Calibri"/>
@@ -14249,7 +14250,7 @@
               <a:t>relu</a:t>
             </a:r>
             <a:r>
-              <a:rPr lang="en-US" dirty="0">
+              <a:rPr lang="en-US">
                 <a:latin typeface="Calibri"/>
                 <a:ea typeface="Calibri"/>
                 <a:cs typeface="Calibri"/>
@@ -14257,7 +14258,7 @@
               <a:t>' and '</a:t>
             </a:r>
             <a:r>
-              <a:rPr lang="en-US" dirty="0" err="1">
+              <a:rPr lang="en-US" err="1">
                 <a:latin typeface="Calibri"/>
                 <a:ea typeface="Calibri"/>
                 <a:cs typeface="Calibri"/>
@@ -14265,7 +14266,7 @@
               <a:t>softmax</a:t>
             </a:r>
             <a:r>
-              <a:rPr lang="en-US" dirty="0">
+              <a:rPr lang="en-US">
                 <a:latin typeface="Calibri"/>
                 <a:ea typeface="Calibri"/>
                 <a:cs typeface="Calibri"/>
@@ -14275,7 +14276,7 @@
           </a:p>
           <a:p>
             <a:r>
-              <a:rPr lang="en-US" dirty="0">
+              <a:rPr lang="en-US">
                 <a:latin typeface="Calibri"/>
                 <a:ea typeface="Calibri"/>
                 <a:cs typeface="Calibri"/>
@@ -14283,7 +14284,7 @@
               <a:t>We created a </a:t>
             </a:r>
             <a:r>
-              <a:rPr lang="en-US" dirty="0" err="1">
+              <a:rPr lang="en-US" err="1">
                 <a:latin typeface="Calibri"/>
                 <a:ea typeface="Calibri"/>
                 <a:cs typeface="Calibri"/>
@@ -14291,7 +14292,7 @@
               <a:t>build_model</a:t>
             </a:r>
             <a:r>
-              <a:rPr lang="en-US" dirty="0">
+              <a:rPr lang="en-US">
                 <a:latin typeface="Calibri"/>
                 <a:ea typeface="Calibri"/>
                 <a:cs typeface="Calibri"/>
@@ -14301,7 +14302,7 @@
           </a:p>
           <a:p>
             <a:r>
-              <a:rPr lang="en-US" dirty="0">
+              <a:rPr lang="en-US">
                 <a:latin typeface="Calibri"/>
                 <a:ea typeface="Calibri"/>
                 <a:cs typeface="Calibri"/>
@@ -14309,7 +14310,7 @@
               <a:t>Given the project is multi class (3) classification, the output layer of the Neural Network used '</a:t>
             </a:r>
             <a:r>
-              <a:rPr lang="en-US" dirty="0" err="1">
+              <a:rPr lang="en-US" err="1">
                 <a:latin typeface="Calibri"/>
                 <a:ea typeface="Calibri"/>
                 <a:cs typeface="Calibri"/>
@@ -14317,7 +14318,7 @@
               <a:t>softmax</a:t>
             </a:r>
             <a:r>
-              <a:rPr lang="en-US" dirty="0">
+              <a:rPr lang="en-US">
                 <a:latin typeface="Calibri"/>
                 <a:ea typeface="Calibri"/>
                 <a:cs typeface="Calibri"/>
@@ -14327,7 +14328,7 @@
           </a:p>
           <a:p>
             <a:r>
-              <a:rPr lang="en-US" dirty="0">
+              <a:rPr lang="en-US">
                 <a:latin typeface="Calibri"/>
                 <a:ea typeface="Calibri"/>
                 <a:cs typeface="Calibri"/>
@@ -14335,7 +14336,7 @@
               <a:t>The loss function employed was </a:t>
             </a:r>
             <a:r>
-              <a:rPr lang="en-US" dirty="0" err="1">
+              <a:rPr lang="en-US" err="1">
                 <a:latin typeface="Calibri"/>
                 <a:ea typeface="Calibri"/>
                 <a:cs typeface="Calibri"/>
@@ -14343,7 +14344,7 @@
               <a:t>sparse_categorical_crossentropy</a:t>
             </a:r>
             <a:r>
-              <a:rPr lang="en-US" dirty="0">
+              <a:rPr lang="en-US">
                 <a:latin typeface="Calibri"/>
                 <a:ea typeface="Calibri"/>
                 <a:cs typeface="Calibri"/>
@@ -14929,9 +14930,19 @@
           <a:lstStyle/>
           <a:p>
             <a:r>
-              <a:rPr lang="en-US"/>
-              <a:t>Animal</a:t>
-            </a:r>
+              <a:rPr lang="en-US" sz="3200">
+                <a:solidFill>
+                  <a:schemeClr val="accent3"/>
+                </a:solidFill>
+                <a:cs typeface="Helvetica"/>
+              </a:rPr>
+              <a:t>Prediction of Species' Extinction Risk Using</a:t>
+            </a:r>
+            <a:endParaRPr lang="en-US" sz="3200">
+              <a:solidFill>
+                <a:schemeClr val="accent3"/>
+              </a:solidFill>
+            </a:endParaRPr>
           </a:p>
         </p:txBody>
       </p:sp>
@@ -14958,13 +14969,102 @@
           </a:xfrm>
         </p:spPr>
         <p:txBody>
-          <a:bodyPr/>
+          <a:bodyPr vert="horz" lIns="91440" tIns="45720" rIns="91440" bIns="45720" rtlCol="0" anchor="t">
+            <a:noAutofit/>
+          </a:bodyPr>
           <a:lstStyle/>
           <a:p>
             <a:r>
-              <a:rPr lang="en-US"/>
-              <a:t>Extinction</a:t>
-            </a:r>
+              <a:rPr lang="en-US" sz="1800" dirty="0">
+                <a:solidFill>
+                  <a:srgbClr val="FFFFFF"/>
+                </a:solidFill>
+                <a:cs typeface="Helvetica"/>
+              </a:rPr>
+              <a:t>Deep Learning, Support Vector Machine &amp; Neural Networks</a:t>
+            </a:r>
+            <a:endParaRPr lang="en-US" sz="1800" dirty="0">
+              <a:solidFill>
+                <a:srgbClr val="FFFFFF"/>
+              </a:solidFill>
+            </a:endParaRPr>
+          </a:p>
+          <a:p>
+            <a:endParaRPr lang="en-US" sz="1800" dirty="0">
+              <a:solidFill>
+                <a:srgbClr val="FFFFFF"/>
+              </a:solidFill>
+              <a:cs typeface="Helvetica"/>
+            </a:endParaRPr>
+          </a:p>
+          <a:p>
+            <a:endParaRPr lang="en-US" sz="1600" dirty="0">
+              <a:solidFill>
+                <a:srgbClr val="FFFFFF"/>
+              </a:solidFill>
+              <a:latin typeface="Helvetica"/>
+              <a:cs typeface="Helvetica"/>
+            </a:endParaRPr>
+          </a:p>
+          <a:p>
+            <a:endParaRPr lang="en-US" sz="1800" dirty="0">
+              <a:solidFill>
+                <a:srgbClr val="FFFFFF"/>
+              </a:solidFill>
+              <a:cs typeface="Helvetica"/>
+            </a:endParaRPr>
+          </a:p>
+          <a:p>
+            <a:endParaRPr lang="en-US"/>
+          </a:p>
+        </p:txBody>
+      </p:sp>
+      <p:sp>
+        <p:nvSpPr>
+          <p:cNvPr id="3" name="TextBox 2">
+            <a:extLst>
+              <a:ext uri="{FF2B5EF4-FFF2-40B4-BE49-F238E27FC236}">
+                <a16:creationId xmlns:a16="http://schemas.microsoft.com/office/drawing/2014/main" id="{1725D237-3421-A99C-FBBE-64291859B34B}"/>
+              </a:ext>
+            </a:extLst>
+          </p:cNvPr>
+          <p:cNvSpPr txBox="1"/>
+          <p:nvPr/>
+        </p:nvSpPr>
+        <p:spPr>
+          <a:xfrm>
+            <a:off x="2146127" y="4515633"/>
+            <a:ext cx="7899747" cy="584775"/>
+          </a:xfrm>
+          <a:prstGeom prst="rect">
+            <a:avLst/>
+          </a:prstGeom>
+          <a:noFill/>
+        </p:spPr>
+        <p:txBody>
+          <a:bodyPr rot="0" spcFirstLastPara="0" vertOverflow="overflow" horzOverflow="overflow" vert="horz" wrap="square" lIns="91440" tIns="45720" rIns="91440" bIns="45720" numCol="1" spcCol="0" rtlCol="0" fromWordArt="0" anchor="t" anchorCtr="0" forceAA="0" compatLnSpc="1">
+            <a:prstTxWarp prst="textNoShape">
+              <a:avLst/>
+            </a:prstTxWarp>
+            <a:spAutoFit/>
+          </a:bodyPr>
+          <a:lstStyle/>
+          <a:p>
+            <a:pPr algn="ctr"/>
+            <a:r>
+              <a:rPr lang="en-US" sz="1600" cap="all" dirty="0">
+                <a:solidFill>
+                  <a:srgbClr val="FFFFFF"/>
+                </a:solidFill>
+                <a:latin typeface="Biome"/>
+                <a:cs typeface="Biome"/>
+              </a:rPr>
+              <a:t>DYLAN BERENS, KATHIANA RODRIGUEZ, SHRUTI YENAMAGANDLA, CARL AGUINALDO, DOMINIC MCDONALD</a:t>
+            </a:r>
+            <a:endParaRPr lang="en-US" sz="1600">
+              <a:latin typeface="Biome"/>
+              <a:cs typeface="Biome"/>
+            </a:endParaRPr>
           </a:p>
         </p:txBody>
       </p:sp>
@@ -15308,27 +15408,27 @@
           <a:lstStyle/>
           <a:p>
             <a:r>
-              <a:rPr lang="en-US" dirty="0">
+              <a:rPr lang="en-US">
                 <a:cs typeface="Biome"/>
               </a:rPr>
               <a:t>Kathiana Rodriguez, Dylan Berens, Shruthi </a:t>
             </a:r>
             <a:r>
-              <a:rPr lang="en-US" dirty="0" err="1">
+              <a:rPr lang="en-US" err="1">
                 <a:cs typeface="Biome"/>
               </a:rPr>
               <a:t>Yenamagandla</a:t>
             </a:r>
             <a:r>
-              <a:rPr lang="en-US" dirty="0">
+              <a:rPr lang="en-US">
                 <a:cs typeface="Biome"/>
               </a:rPr>
               <a:t>, Dominic McDonald, Carl Aguinaldo</a:t>
             </a:r>
-            <a:endParaRPr lang="en-US" dirty="0"/>
-          </a:p>
-          <a:p>
-            <a:endParaRPr lang="en-US" dirty="0"/>
+            <a:endParaRPr lang="en-US"/>
+          </a:p>
+          <a:p>
+            <a:endParaRPr lang="en-US"/>
           </a:p>
         </p:txBody>
       </p:sp>
@@ -15450,7 +15550,7 @@
           <a:lstStyle/>
           <a:p>
             <a:r>
-              <a:rPr lang="en-US" sz="1500" dirty="0">
+              <a:rPr lang="en-US" sz="1500">
                 <a:cs typeface="Biome"/>
               </a:rPr>
               <a:t>Insight Overview</a:t>
@@ -15458,7 +15558,7 @@
           </a:p>
           <a:p>
             <a:r>
-              <a:rPr lang="en-US" sz="1500" dirty="0">
+              <a:rPr lang="en-US" sz="1500">
                 <a:cs typeface="Biome"/>
               </a:rPr>
               <a:t>Dataset Overview</a:t>
@@ -15466,7 +15566,7 @@
           </a:p>
           <a:p>
             <a:r>
-              <a:rPr lang="en-US" sz="1500" dirty="0">
+              <a:rPr lang="en-US" sz="1500">
                 <a:cs typeface="Biome"/>
               </a:rPr>
               <a:t>Data Visualization</a:t>
@@ -15474,16 +15574,16 @@
           </a:p>
           <a:p>
             <a:r>
-              <a:rPr lang="en-US" sz="1500" dirty="0">
+              <a:rPr lang="en-US" sz="1500">
                 <a:cs typeface="Biome"/>
               </a:rPr>
               <a:t>Neural Networks</a:t>
             </a:r>
-            <a:endParaRPr lang="en-US" sz="1500" dirty="0"/>
-          </a:p>
-          <a:p>
-            <a:r>
-              <a:rPr lang="en-US" sz="1500" dirty="0">
+            <a:endParaRPr lang="en-US" sz="1500"/>
+          </a:p>
+          <a:p>
+            <a:r>
+              <a:rPr lang="en-US" sz="1500">
                 <a:cs typeface="Biome"/>
               </a:rPr>
               <a:t>SVM</a:t>
@@ -15491,7 +15591,7 @@
           </a:p>
           <a:p>
             <a:r>
-              <a:rPr lang="en-US" sz="1500" dirty="0">
+              <a:rPr lang="en-US" sz="1500">
                 <a:cs typeface="Biome"/>
               </a:rPr>
               <a:t>Final Takeaways and a Call to Action</a:t>
@@ -15782,13 +15882,7 @@
           <a:p>
             <a:r>
               <a:rPr lang="en-US"/>
-              <a:t>Use live polls or surveys to gather audience opinions, promoting engagement and making sure the audience feel involved</a:t>
-            </a:r>
-          </a:p>
-          <a:p>
-            <a:r>
-              <a:rPr lang="en-US"/>
-              <a:t> Threat levels have increased over time</a:t>
+              <a:t>Threat levels have increased over time</a:t>
             </a:r>
           </a:p>
           <a:p>
@@ -16349,7 +16443,7 @@
           <a:lstStyle/>
           <a:p>
             <a:r>
-              <a:rPr lang="en-US" dirty="0">
+              <a:rPr lang="en-US">
                 <a:cs typeface="Biome"/>
               </a:rPr>
               <a:t>Species Risk Levels by Environmental Domain Continued</a:t>
@@ -17476,26 +17570,6 @@
 </file>
 
 <file path=customXml/item1.xml><?xml version="1.0" encoding="utf-8"?>
-<p:properties xmlns:p="http://schemas.microsoft.com/office/2006/metadata/properties" xmlns:xsi="http://www.w3.org/2001/XMLSchema-instance" xmlns:pc="http://schemas.microsoft.com/office/infopath/2007/PartnerControls">
-  <documentManagement>
-    <_ip_UnifiedCompliancePolicyUIAction xmlns="http://schemas.microsoft.com/sharepoint/v3" xsi:nil="true"/>
-    <Image xmlns="71af3243-3dd4-4a8d-8c0d-dd76da1f02a5">
-      <Url xsi:nil="true"/>
-      <Description xsi:nil="true"/>
-    </Image>
-    <Status xmlns="71af3243-3dd4-4a8d-8c0d-dd76da1f02a5">Not started</Status>
-    <Background xmlns="71af3243-3dd4-4a8d-8c0d-dd76da1f02a5">false</Background>
-    <_ip_UnifiedCompliancePolicyProperties xmlns="http://schemas.microsoft.com/sharepoint/v3" xsi:nil="true"/>
-    <ImageTagsTaxHTField xmlns="71af3243-3dd4-4a8d-8c0d-dd76da1f02a5">
-      <Terms xmlns="http://schemas.microsoft.com/office/infopath/2007/PartnerControls"/>
-    </ImageTagsTaxHTField>
-    <TaxCatchAll xmlns="230e9df3-be65-4c73-a93b-d1236ebd677e" xsi:nil="true"/>
-    <MediaServiceKeyPoints xmlns="71af3243-3dd4-4a8d-8c0d-dd76da1f02a5" xsi:nil="true"/>
-  </documentManagement>
-</p:properties>
-</file>
-
-<file path=customXml/item2.xml><?xml version="1.0" encoding="utf-8"?>
 <ct:contentTypeSchema xmlns:ct="http://schemas.microsoft.com/office/2006/metadata/contentType" xmlns:ma="http://schemas.microsoft.com/office/2006/metadata/properties/metaAttributes" ct:_="" ma:_="" ma:contentTypeName="Document" ma:contentTypeID="0x01010079F111ED35F8CC479449609E8A0923A6" ma:contentTypeVersion="28" ma:contentTypeDescription="Create a new document." ma:contentTypeScope="" ma:versionID="60f5a4f2d2b0abadcf532d48ebf9cb71">
   <xsd:schema xmlns:xsd="http://www.w3.org/2001/XMLSchema" xmlns:xs="http://www.w3.org/2001/XMLSchema" xmlns:p="http://schemas.microsoft.com/office/2006/metadata/properties" xmlns:ns1="http://schemas.microsoft.com/sharepoint/v3" xmlns:ns2="71af3243-3dd4-4a8d-8c0d-dd76da1f02a5" xmlns:ns3="16c05727-aa75-4e4a-9b5f-8a80a1165891" xmlns:ns4="230e9df3-be65-4c73-a93b-d1236ebd677e" targetNamespace="http://schemas.microsoft.com/office/2006/metadata/properties" ma:root="true" ma:fieldsID="7dd78129e6a1811f84807ad11c651531" ns1:_="" ns2:_="" ns3:_="" ns4:_="">
     <xsd:import namespace="http://schemas.microsoft.com/sharepoint/v3"/>
@@ -17807,7 +17881,7 @@
 </ct:contentTypeSchema>
 </file>
 
-<file path=customXml/item3.xml><?xml version="1.0" encoding="utf-8"?>
+<file path=customXml/item2.xml><?xml version="1.0" encoding="utf-8"?>
 <?mso-contentType ?>
 <FormTemplates xmlns="http://schemas.microsoft.com/sharepoint/v3/contenttype/forms">
   <Display>DocumentLibraryForm</Display>
@@ -17816,19 +17890,27 @@
 </FormTemplates>
 </file>
 
-<file path=customXml/itemProps1.xml><?xml version="1.0" encoding="utf-8"?>
-<ds:datastoreItem xmlns:ds="http://schemas.openxmlformats.org/officeDocument/2006/customXml" ds:itemID="{E305301E-11B3-4B9D-A588-21F3C9809371}">
-  <ds:schemaRefs>
-    <ds:schemaRef ds:uri="230e9df3-be65-4c73-a93b-d1236ebd677e"/>
-    <ds:schemaRef ds:uri="71af3243-3dd4-4a8d-8c0d-dd76da1f02a5"/>
-    <ds:schemaRef ds:uri="http://schemas.microsoft.com/office/2006/metadata/properties"/>
-    <ds:schemaRef ds:uri="http://schemas.microsoft.com/office/infopath/2007/PartnerControls"/>
-    <ds:schemaRef ds:uri="http://schemas.microsoft.com/sharepoint/v3"/>
-  </ds:schemaRefs>
-</ds:datastoreItem>
+<file path=customXml/item3.xml><?xml version="1.0" encoding="utf-8"?>
+<p:properties xmlns:p="http://schemas.microsoft.com/office/2006/metadata/properties" xmlns:xsi="http://www.w3.org/2001/XMLSchema-instance" xmlns:pc="http://schemas.microsoft.com/office/infopath/2007/PartnerControls">
+  <documentManagement>
+    <_ip_UnifiedCompliancePolicyUIAction xmlns="http://schemas.microsoft.com/sharepoint/v3" xsi:nil="true"/>
+    <Image xmlns="71af3243-3dd4-4a8d-8c0d-dd76da1f02a5">
+      <Url xsi:nil="true"/>
+      <Description xsi:nil="true"/>
+    </Image>
+    <Status xmlns="71af3243-3dd4-4a8d-8c0d-dd76da1f02a5">Not started</Status>
+    <Background xmlns="71af3243-3dd4-4a8d-8c0d-dd76da1f02a5">false</Background>
+    <_ip_UnifiedCompliancePolicyProperties xmlns="http://schemas.microsoft.com/sharepoint/v3" xsi:nil="true"/>
+    <ImageTagsTaxHTField xmlns="71af3243-3dd4-4a8d-8c0d-dd76da1f02a5">
+      <Terms xmlns="http://schemas.microsoft.com/office/infopath/2007/PartnerControls"/>
+    </ImageTagsTaxHTField>
+    <TaxCatchAll xmlns="230e9df3-be65-4c73-a93b-d1236ebd677e" xsi:nil="true"/>
+    <MediaServiceKeyPoints xmlns="71af3243-3dd4-4a8d-8c0d-dd76da1f02a5" xsi:nil="true"/>
+  </documentManagement>
+</p:properties>
 </file>
 
-<file path=customXml/itemProps2.xml><?xml version="1.0" encoding="utf-8"?>
+<file path=customXml/itemProps1.xml><?xml version="1.0" encoding="utf-8"?>
 <ds:datastoreItem xmlns:ds="http://schemas.openxmlformats.org/officeDocument/2006/customXml" ds:itemID="{C77B561B-3A65-4A22-9691-EB838E7F9B87}">
   <ds:schemaRefs>
     <ds:schemaRef ds:uri="16c05727-aa75-4e4a-9b5f-8a80a1165891"/>
@@ -17849,7 +17931,7 @@
 </ds:datastoreItem>
 </file>
 
-<file path=customXml/itemProps3.xml><?xml version="1.0" encoding="utf-8"?>
+<file path=customXml/itemProps2.xml><?xml version="1.0" encoding="utf-8"?>
 <ds:datastoreItem xmlns:ds="http://schemas.openxmlformats.org/officeDocument/2006/customXml" ds:itemID="{44137456-21FC-4AE2-8A94-BF06CAF2EB9B}">
   <ds:schemaRefs>
     <ds:schemaRef ds:uri="http://schemas.microsoft.com/sharepoint/v3/contenttype/forms"/>
@@ -17857,6 +17939,18 @@
 </ds:datastoreItem>
 </file>
 
+<file path=customXml/itemProps3.xml><?xml version="1.0" encoding="utf-8"?>
+<ds:datastoreItem xmlns:ds="http://schemas.openxmlformats.org/officeDocument/2006/customXml" ds:itemID="{E305301E-11B3-4B9D-A588-21F3C9809371}">
+  <ds:schemaRefs>
+    <ds:schemaRef ds:uri="230e9df3-be65-4c73-a93b-d1236ebd677e"/>
+    <ds:schemaRef ds:uri="71af3243-3dd4-4a8d-8c0d-dd76da1f02a5"/>
+    <ds:schemaRef ds:uri="http://schemas.microsoft.com/office/2006/metadata/properties"/>
+    <ds:schemaRef ds:uri="http://schemas.microsoft.com/office/infopath/2007/PartnerControls"/>
+    <ds:schemaRef ds:uri="http://schemas.microsoft.com/sharepoint/v3"/>
+  </ds:schemaRefs>
+</ds:datastoreItem>
+</file>
+
 <file path=docMetadata/LabelInfo.xml><?xml version="1.0" encoding="utf-8"?>
 <clbl:labelList xmlns:clbl="http://schemas.microsoft.com/office/2020/mipLabelMetadata"/>
 </file>
</xml_diff>